<commit_message>
Fixed typo in image
</commit_message>
<xml_diff>
--- a/boards/openmv-cam/v3/cam-v3-pinout.pptx
+++ b/boards/openmv-cam/v3/cam-v3-pinout.pptx
@@ -243,7 +243,7 @@
           <a:p>
             <a:fld id="{5169B0FF-CDA1-4BA2-882E-918BF983E683}" type="datetimeFigureOut">
               <a:rPr lang="en-US" smtClean="0"/>
-              <a:t>12/2/2016</a:t>
+              <a:t>12/7/2016</a:t>
             </a:fld>
             <a:endParaRPr lang="en-US"/>
           </a:p>
@@ -413,7 +413,7 @@
           <a:p>
             <a:fld id="{5169B0FF-CDA1-4BA2-882E-918BF983E683}" type="datetimeFigureOut">
               <a:rPr lang="en-US" smtClean="0"/>
-              <a:t>12/2/2016</a:t>
+              <a:t>12/7/2016</a:t>
             </a:fld>
             <a:endParaRPr lang="en-US"/>
           </a:p>
@@ -593,7 +593,7 @@
           <a:p>
             <a:fld id="{5169B0FF-CDA1-4BA2-882E-918BF983E683}" type="datetimeFigureOut">
               <a:rPr lang="en-US" smtClean="0"/>
-              <a:t>12/2/2016</a:t>
+              <a:t>12/7/2016</a:t>
             </a:fld>
             <a:endParaRPr lang="en-US"/>
           </a:p>
@@ -763,7 +763,7 @@
           <a:p>
             <a:fld id="{5169B0FF-CDA1-4BA2-882E-918BF983E683}" type="datetimeFigureOut">
               <a:rPr lang="en-US" smtClean="0"/>
-              <a:t>12/2/2016</a:t>
+              <a:t>12/7/2016</a:t>
             </a:fld>
             <a:endParaRPr lang="en-US"/>
           </a:p>
@@ -1009,7 +1009,7 @@
           <a:p>
             <a:fld id="{5169B0FF-CDA1-4BA2-882E-918BF983E683}" type="datetimeFigureOut">
               <a:rPr lang="en-US" smtClean="0"/>
-              <a:t>12/2/2016</a:t>
+              <a:t>12/7/2016</a:t>
             </a:fld>
             <a:endParaRPr lang="en-US"/>
           </a:p>
@@ -1241,7 +1241,7 @@
           <a:p>
             <a:fld id="{5169B0FF-CDA1-4BA2-882E-918BF983E683}" type="datetimeFigureOut">
               <a:rPr lang="en-US" smtClean="0"/>
-              <a:t>12/2/2016</a:t>
+              <a:t>12/7/2016</a:t>
             </a:fld>
             <a:endParaRPr lang="en-US"/>
           </a:p>
@@ -1608,7 +1608,7 @@
           <a:p>
             <a:fld id="{5169B0FF-CDA1-4BA2-882E-918BF983E683}" type="datetimeFigureOut">
               <a:rPr lang="en-US" smtClean="0"/>
-              <a:t>12/2/2016</a:t>
+              <a:t>12/7/2016</a:t>
             </a:fld>
             <a:endParaRPr lang="en-US"/>
           </a:p>
@@ -1726,7 +1726,7 @@
           <a:p>
             <a:fld id="{5169B0FF-CDA1-4BA2-882E-918BF983E683}" type="datetimeFigureOut">
               <a:rPr lang="en-US" smtClean="0"/>
-              <a:t>12/2/2016</a:t>
+              <a:t>12/7/2016</a:t>
             </a:fld>
             <a:endParaRPr lang="en-US"/>
           </a:p>
@@ -1821,7 +1821,7 @@
           <a:p>
             <a:fld id="{5169B0FF-CDA1-4BA2-882E-918BF983E683}" type="datetimeFigureOut">
               <a:rPr lang="en-US" smtClean="0"/>
-              <a:t>12/2/2016</a:t>
+              <a:t>12/7/2016</a:t>
             </a:fld>
             <a:endParaRPr lang="en-US"/>
           </a:p>
@@ -2098,7 +2098,7 @@
           <a:p>
             <a:fld id="{5169B0FF-CDA1-4BA2-882E-918BF983E683}" type="datetimeFigureOut">
               <a:rPr lang="en-US" smtClean="0"/>
-              <a:t>12/2/2016</a:t>
+              <a:t>12/7/2016</a:t>
             </a:fld>
             <a:endParaRPr lang="en-US"/>
           </a:p>
@@ -2355,7 +2355,7 @@
           <a:p>
             <a:fld id="{5169B0FF-CDA1-4BA2-882E-918BF983E683}" type="datetimeFigureOut">
               <a:rPr lang="en-US" smtClean="0"/>
-              <a:t>12/2/2016</a:t>
+              <a:t>12/7/2016</a:t>
             </a:fld>
             <a:endParaRPr lang="en-US"/>
           </a:p>
@@ -2568,7 +2568,7 @@
           <a:p>
             <a:fld id="{5169B0FF-CDA1-4BA2-882E-918BF983E683}" type="datetimeFigureOut">
               <a:rPr lang="en-US" smtClean="0"/>
-              <a:t>12/2/2016</a:t>
+              <a:t>12/7/2016</a:t>
             </a:fld>
             <a:endParaRPr lang="en-US"/>
           </a:p>
@@ -6292,8 +6292,9 @@
               <a:pPr algn="ctr"/>
               <a:r>
                 <a:rPr lang="en-US" sz="1200" dirty="0" smtClean="0"/>
-                <a:t>P10</a:t>
+                <a:t>P9</a:t>
               </a:r>
+              <a:endParaRPr lang="en-US" sz="1200" dirty="0" smtClean="0"/>
             </a:p>
           </p:txBody>
         </p:sp>

</xml_diff>